<commit_message>
Add big picture video
</commit_message>
<xml_diff>
--- a/lectures/bigpicture.pptx
+++ b/lectures/bigpicture.pptx
@@ -199,7 +199,7 @@
           <a:p>
             <a:fld id="{C97B56FC-7D2E-F343-9D09-0D14B00AA564}" type="datetimeFigureOut">
               <a:rPr lang="en-US" smtClean="0"/>
-              <a:t>9/11/24</a:t>
+              <a:t>10/22/24</a:t>
             </a:fld>
             <a:endParaRPr lang="en-US"/>
           </a:p>
@@ -596,7 +596,7 @@
           <a:p>
             <a:fld id="{EEE7C04C-7AF8-1445-A186-502B631B934F}" type="datetimeFigureOut">
               <a:rPr lang="en-US" smtClean="0"/>
-              <a:t>9/11/24</a:t>
+              <a:t>10/22/24</a:t>
             </a:fld>
             <a:endParaRPr lang="en-US"/>
           </a:p>
@@ -761,7 +761,7 @@
           <a:p>
             <a:fld id="{EEE7C04C-7AF8-1445-A186-502B631B934F}" type="datetimeFigureOut">
               <a:rPr lang="en-US" smtClean="0"/>
-              <a:t>9/11/24</a:t>
+              <a:t>10/22/24</a:t>
             </a:fld>
             <a:endParaRPr lang="en-US"/>
           </a:p>
@@ -936,7 +936,7 @@
           <a:p>
             <a:fld id="{EEE7C04C-7AF8-1445-A186-502B631B934F}" type="datetimeFigureOut">
               <a:rPr lang="en-US" smtClean="0"/>
-              <a:t>9/11/24</a:t>
+              <a:t>10/22/24</a:t>
             </a:fld>
             <a:endParaRPr lang="en-US"/>
           </a:p>
@@ -1101,7 +1101,7 @@
           <a:p>
             <a:fld id="{EEE7C04C-7AF8-1445-A186-502B631B934F}" type="datetimeFigureOut">
               <a:rPr lang="en-US" smtClean="0"/>
-              <a:t>9/11/24</a:t>
+              <a:t>10/22/24</a:t>
             </a:fld>
             <a:endParaRPr lang="en-US"/>
           </a:p>
@@ -1342,7 +1342,7 @@
           <a:p>
             <a:fld id="{EEE7C04C-7AF8-1445-A186-502B631B934F}" type="datetimeFigureOut">
               <a:rPr lang="en-US" smtClean="0"/>
-              <a:t>9/11/24</a:t>
+              <a:t>10/22/24</a:t>
             </a:fld>
             <a:endParaRPr lang="en-US"/>
           </a:p>
@@ -1569,7 +1569,7 @@
           <a:p>
             <a:fld id="{EEE7C04C-7AF8-1445-A186-502B631B934F}" type="datetimeFigureOut">
               <a:rPr lang="en-US" smtClean="0"/>
-              <a:t>9/11/24</a:t>
+              <a:t>10/22/24</a:t>
             </a:fld>
             <a:endParaRPr lang="en-US"/>
           </a:p>
@@ -1931,7 +1931,7 @@
           <a:p>
             <a:fld id="{EEE7C04C-7AF8-1445-A186-502B631B934F}" type="datetimeFigureOut">
               <a:rPr lang="en-US" smtClean="0"/>
-              <a:t>9/11/24</a:t>
+              <a:t>10/22/24</a:t>
             </a:fld>
             <a:endParaRPr lang="en-US"/>
           </a:p>
@@ -2044,7 +2044,7 @@
           <a:p>
             <a:fld id="{EEE7C04C-7AF8-1445-A186-502B631B934F}" type="datetimeFigureOut">
               <a:rPr lang="en-US" smtClean="0"/>
-              <a:t>9/11/24</a:t>
+              <a:t>10/22/24</a:t>
             </a:fld>
             <a:endParaRPr lang="en-US"/>
           </a:p>
@@ -2134,7 +2134,7 @@
           <a:p>
             <a:fld id="{EEE7C04C-7AF8-1445-A186-502B631B934F}" type="datetimeFigureOut">
               <a:rPr lang="en-US" smtClean="0"/>
-              <a:t>9/11/24</a:t>
+              <a:t>10/22/24</a:t>
             </a:fld>
             <a:endParaRPr lang="en-US"/>
           </a:p>
@@ -2406,7 +2406,7 @@
           <a:p>
             <a:fld id="{EEE7C04C-7AF8-1445-A186-502B631B934F}" type="datetimeFigureOut">
               <a:rPr lang="en-US" smtClean="0"/>
-              <a:t>9/11/24</a:t>
+              <a:t>10/22/24</a:t>
             </a:fld>
             <a:endParaRPr lang="en-US"/>
           </a:p>
@@ -2658,7 +2658,7 @@
           <a:p>
             <a:fld id="{EEE7C04C-7AF8-1445-A186-502B631B934F}" type="datetimeFigureOut">
               <a:rPr lang="en-US" smtClean="0"/>
-              <a:t>9/11/24</a:t>
+              <a:t>10/22/24</a:t>
             </a:fld>
             <a:endParaRPr lang="en-US"/>
           </a:p>
@@ -2865,7 +2865,7 @@
           <a:p>
             <a:fld id="{EEE7C04C-7AF8-1445-A186-502B631B934F}" type="datetimeFigureOut">
               <a:rPr lang="en-US" smtClean="0"/>
-              <a:t>9/11/24</a:t>
+              <a:t>10/22/24</a:t>
             </a:fld>
             <a:endParaRPr lang="en-US"/>
           </a:p>
@@ -5469,30 +5469,163 @@
           <a:chExt cx="0" cy="0"/>
         </a:xfrm>
       </p:grpSpPr>
+      <p:sp>
+        <p:nvSpPr>
+          <p:cNvPr id="8" name="Rectangle 7">
+            <a:extLst>
+              <a:ext uri="{FF2B5EF4-FFF2-40B4-BE49-F238E27FC236}">
+                <a16:creationId xmlns:a16="http://schemas.microsoft.com/office/drawing/2014/main" id="{01D0AF59-99C3-4251-AB9A-C966C6AD4400}"/>
+              </a:ext>
+              <a:ext uri="{C183D7F6-B498-43B3-948B-1728B52AA6E4}">
+                <adec:decorative xmlns:adec="http://schemas.microsoft.com/office/drawing/2017/decorative" val="1"/>
+              </a:ext>
+            </a:extLst>
+          </p:cNvPr>
+          <p:cNvSpPr>
+            <a:spLocks noGrp="1" noRot="1" noChangeAspect="1" noMove="1" noResize="1" noEditPoints="1" noAdjustHandles="1" noChangeArrowheads="1" noChangeShapeType="1" noTextEdit="1"/>
+          </p:cNvSpPr>
+          <p:nvPr>
+            <p:extLst>
+              <p:ext uri="{386F3935-93C4-4BCD-93E2-E3B085C9AB24}">
+                <p16:designElem xmlns:p16="http://schemas.microsoft.com/office/powerpoint/2015/main" val="1"/>
+              </p:ext>
+            </p:extLst>
+          </p:nvPr>
+        </p:nvSpPr>
+        <p:spPr>
+          <a:xfrm>
+            <a:off x="0" y="0"/>
+            <a:ext cx="12192000" cy="6858000"/>
+          </a:xfrm>
+          <a:prstGeom prst="rect">
+            <a:avLst/>
+          </a:prstGeom>
+          <a:solidFill>
+            <a:schemeClr val="bg2"/>
+          </a:solidFill>
+          <a:ln>
+            <a:noFill/>
+          </a:ln>
+        </p:spPr>
+        <p:style>
+          <a:lnRef idx="2">
+            <a:schemeClr val="accent1">
+              <a:shade val="50000"/>
+            </a:schemeClr>
+          </a:lnRef>
+          <a:fillRef idx="1">
+            <a:schemeClr val="accent1"/>
+          </a:fillRef>
+          <a:effectRef idx="0">
+            <a:schemeClr val="accent1"/>
+          </a:effectRef>
+          <a:fontRef idx="minor">
+            <a:schemeClr val="lt1"/>
+          </a:fontRef>
+        </p:style>
+        <p:txBody>
+          <a:bodyPr rtlCol="0" anchor="ctr"/>
+          <a:lstStyle/>
+          <a:p>
+            <a:pPr algn="ctr"/>
+            <a:endParaRPr lang="en-US"/>
+          </a:p>
+        </p:txBody>
+      </p:sp>
+      <p:sp>
+        <p:nvSpPr>
+          <p:cNvPr id="10" name="Rectangle 9">
+            <a:extLst>
+              <a:ext uri="{FF2B5EF4-FFF2-40B4-BE49-F238E27FC236}">
+                <a16:creationId xmlns:a16="http://schemas.microsoft.com/office/drawing/2014/main" id="{1855405F-37A2-4869-9154-F8BE3BECE6C3}"/>
+              </a:ext>
+              <a:ext uri="{C183D7F6-B498-43B3-948B-1728B52AA6E4}">
+                <adec:decorative xmlns:adec="http://schemas.microsoft.com/office/drawing/2017/decorative" val="1"/>
+              </a:ext>
+            </a:extLst>
+          </p:cNvPr>
+          <p:cNvSpPr>
+            <a:spLocks noGrp="1" noRot="1" noChangeAspect="1" noMove="1" noResize="1" noEditPoints="1" noAdjustHandles="1" noChangeArrowheads="1" noChangeShapeType="1" noTextEdit="1"/>
+          </p:cNvSpPr>
+          <p:nvPr>
+            <p:extLst>
+              <p:ext uri="{386F3935-93C4-4BCD-93E2-E3B085C9AB24}">
+                <p16:designElem xmlns:p16="http://schemas.microsoft.com/office/powerpoint/2015/main" val="1"/>
+              </p:ext>
+            </p:extLst>
+          </p:nvPr>
+        </p:nvSpPr>
+        <p:spPr>
+          <a:xfrm>
+            <a:off x="477012" y="480060"/>
+            <a:ext cx="11237976" cy="5897880"/>
+          </a:xfrm>
+          <a:prstGeom prst="rect">
+            <a:avLst/>
+          </a:prstGeom>
+          <a:solidFill>
+            <a:srgbClr val="FFFFFF"/>
+          </a:solidFill>
+          <a:ln w="9525">
+            <a:noFill/>
+          </a:ln>
+          <a:effectLst>
+            <a:outerShdw blurRad="63500" dist="17780" dir="5400000" algn="t" rotWithShape="0">
+              <a:prstClr val="black">
+                <a:alpha val="43000"/>
+              </a:prstClr>
+            </a:outerShdw>
+          </a:effectLst>
+        </p:spPr>
+        <p:style>
+          <a:lnRef idx="2">
+            <a:schemeClr val="accent1">
+              <a:shade val="50000"/>
+            </a:schemeClr>
+          </a:lnRef>
+          <a:fillRef idx="1">
+            <a:schemeClr val="accent1"/>
+          </a:fillRef>
+          <a:effectRef idx="0">
+            <a:schemeClr val="accent1"/>
+          </a:effectRef>
+          <a:fontRef idx="minor">
+            <a:schemeClr val="lt1"/>
+          </a:fontRef>
+        </p:style>
+        <p:txBody>
+          <a:bodyPr rtlCol="0" anchor="ctr"/>
+          <a:lstStyle/>
+          <a:p>
+            <a:pPr algn="ctr"/>
+            <a:endParaRPr lang="en-US"/>
+          </a:p>
+        </p:txBody>
+      </p:sp>
       <p:pic>
         <p:nvPicPr>
-          <p:cNvPr id="4" name="Picture 3"/>
+          <p:cNvPr id="3" name="Picture 2" descr="A screenshot of a computer&#10;&#10;Description automatically generated">
+            <a:extLst>
+              <a:ext uri="{FF2B5EF4-FFF2-40B4-BE49-F238E27FC236}">
+                <a16:creationId xmlns:a16="http://schemas.microsoft.com/office/drawing/2014/main" id="{735112A3-42B8-F19B-940E-C5BB916193F4}"/>
+              </a:ext>
+            </a:extLst>
+          </p:cNvPr>
           <p:cNvPicPr>
             <a:picLocks noChangeAspect="1"/>
           </p:cNvPicPr>
           <p:nvPr/>
         </p:nvPicPr>
         <p:blipFill>
-          <a:blip r:embed="rId2">
-            <a:extLst>
-              <a:ext uri="{28A0092B-C50C-407E-A947-70E740481C1C}">
-                <a14:useLocalDpi xmlns:a14="http://schemas.microsoft.com/office/drawing/2010/main" val="0"/>
-              </a:ext>
-            </a:extLst>
-          </a:blip>
+          <a:blip r:embed="rId2"/>
           <a:stretch>
             <a:fillRect/>
           </a:stretch>
         </p:blipFill>
         <p:spPr>
           <a:xfrm>
-            <a:off x="643467" y="893571"/>
-            <a:ext cx="10905066" cy="5070856"/>
+            <a:off x="643467" y="1561507"/>
+            <a:ext cx="10905066" cy="3734985"/>
           </a:xfrm>
           <a:prstGeom prst="rect">
             <a:avLst/>

</xml_diff>